<commit_message>
Presentación del borrador del fronted
</commit_message>
<xml_diff>
--- a/Fronted proyecto.pptx
+++ b/Fronted proyecto.pptx
@@ -5,7 +5,7 @@
     <p:sldMasterId id="2147483648" r:id="rId1"/>
   </p:sldMasterIdLst>
   <p:notesMasterIdLst>
-    <p:notesMasterId r:id="rId10"/>
+    <p:notesMasterId r:id="rId11"/>
   </p:notesMasterIdLst>
   <p:sldIdLst>
     <p:sldId id="256" r:id="rId2"/>
@@ -16,6 +16,7 @@
     <p:sldId id="261" r:id="rId7"/>
     <p:sldId id="262" r:id="rId8"/>
     <p:sldId id="263" r:id="rId9"/>
+    <p:sldId id="264" r:id="rId10"/>
   </p:sldIdLst>
   <p:sldSz cx="12192000" cy="6858000"/>
   <p:notesSz cx="6858000" cy="9144000"/>
@@ -114,6 +115,11 @@
       </a:defRPr>
     </a:lvl9pPr>
   </p:defaultTextStyle>
+  <p:extLst>
+    <p:ext uri="{EFAFB233-063F-42B5-8137-9DF3F51BA10A}">
+      <p15:sldGuideLst xmlns:p15="http://schemas.microsoft.com/office/powerpoint/2012/main"/>
+    </p:ext>
+  </p:extLst>
 </p:presentation>
 </file>
 
@@ -199,7 +205,7 @@
           <a:p>
             <a:fld id="{36E2CE85-1916-41D7-8397-3558049536AB}" type="datetimeFigureOut">
               <a:rPr lang="es-ES" smtClean="0"/>
-              <a:t>12/10/2025</a:t>
+              <a:t>13/10/2025</a:t>
             </a:fld>
             <a:endParaRPr lang="es-ES"/>
           </a:p>
@@ -697,7 +703,7 @@
           <a:p>
             <a:fld id="{055E2FD2-4099-4609-A1FE-270EBC833285}" type="datetimeFigureOut">
               <a:rPr lang="es-ES" smtClean="0"/>
-              <a:t>12/10/2025</a:t>
+              <a:t>13/10/2025</a:t>
             </a:fld>
             <a:endParaRPr lang="es-ES"/>
           </a:p>
@@ -895,7 +901,7 @@
           <a:p>
             <a:fld id="{055E2FD2-4099-4609-A1FE-270EBC833285}" type="datetimeFigureOut">
               <a:rPr lang="es-ES" smtClean="0"/>
-              <a:t>12/10/2025</a:t>
+              <a:t>13/10/2025</a:t>
             </a:fld>
             <a:endParaRPr lang="es-ES"/>
           </a:p>
@@ -1103,7 +1109,7 @@
           <a:p>
             <a:fld id="{055E2FD2-4099-4609-A1FE-270EBC833285}" type="datetimeFigureOut">
               <a:rPr lang="es-ES" smtClean="0"/>
-              <a:t>12/10/2025</a:t>
+              <a:t>13/10/2025</a:t>
             </a:fld>
             <a:endParaRPr lang="es-ES"/>
           </a:p>
@@ -1301,7 +1307,7 @@
           <a:p>
             <a:fld id="{055E2FD2-4099-4609-A1FE-270EBC833285}" type="datetimeFigureOut">
               <a:rPr lang="es-ES" smtClean="0"/>
-              <a:t>12/10/2025</a:t>
+              <a:t>13/10/2025</a:t>
             </a:fld>
             <a:endParaRPr lang="es-ES"/>
           </a:p>
@@ -1576,7 +1582,7 @@
           <a:p>
             <a:fld id="{055E2FD2-4099-4609-A1FE-270EBC833285}" type="datetimeFigureOut">
               <a:rPr lang="es-ES" smtClean="0"/>
-              <a:t>12/10/2025</a:t>
+              <a:t>13/10/2025</a:t>
             </a:fld>
             <a:endParaRPr lang="es-ES"/>
           </a:p>
@@ -1841,7 +1847,7 @@
           <a:p>
             <a:fld id="{055E2FD2-4099-4609-A1FE-270EBC833285}" type="datetimeFigureOut">
               <a:rPr lang="es-ES" smtClean="0"/>
-              <a:t>12/10/2025</a:t>
+              <a:t>13/10/2025</a:t>
             </a:fld>
             <a:endParaRPr lang="es-ES"/>
           </a:p>
@@ -2253,7 +2259,7 @@
           <a:p>
             <a:fld id="{055E2FD2-4099-4609-A1FE-270EBC833285}" type="datetimeFigureOut">
               <a:rPr lang="es-ES" smtClean="0"/>
-              <a:t>12/10/2025</a:t>
+              <a:t>13/10/2025</a:t>
             </a:fld>
             <a:endParaRPr lang="es-ES"/>
           </a:p>
@@ -2394,7 +2400,7 @@
           <a:p>
             <a:fld id="{055E2FD2-4099-4609-A1FE-270EBC833285}" type="datetimeFigureOut">
               <a:rPr lang="es-ES" smtClean="0"/>
-              <a:t>12/10/2025</a:t>
+              <a:t>13/10/2025</a:t>
             </a:fld>
             <a:endParaRPr lang="es-ES"/>
           </a:p>
@@ -2507,7 +2513,7 @@
           <a:p>
             <a:fld id="{055E2FD2-4099-4609-A1FE-270EBC833285}" type="datetimeFigureOut">
               <a:rPr lang="es-ES" smtClean="0"/>
-              <a:t>12/10/2025</a:t>
+              <a:t>13/10/2025</a:t>
             </a:fld>
             <a:endParaRPr lang="es-ES"/>
           </a:p>
@@ -2818,7 +2824,7 @@
           <a:p>
             <a:fld id="{055E2FD2-4099-4609-A1FE-270EBC833285}" type="datetimeFigureOut">
               <a:rPr lang="es-ES" smtClean="0"/>
-              <a:t>12/10/2025</a:t>
+              <a:t>13/10/2025</a:t>
             </a:fld>
             <a:endParaRPr lang="es-ES"/>
           </a:p>
@@ -3106,7 +3112,7 @@
           <a:p>
             <a:fld id="{055E2FD2-4099-4609-A1FE-270EBC833285}" type="datetimeFigureOut">
               <a:rPr lang="es-ES" smtClean="0"/>
-              <a:t>12/10/2025</a:t>
+              <a:t>13/10/2025</a:t>
             </a:fld>
             <a:endParaRPr lang="es-ES"/>
           </a:p>
@@ -3347,7 +3353,7 @@
           <a:p>
             <a:fld id="{055E2FD2-4099-4609-A1FE-270EBC833285}" type="datetimeFigureOut">
               <a:rPr lang="es-ES" smtClean="0"/>
-              <a:t>12/10/2025</a:t>
+              <a:t>13/10/2025</a:t>
             </a:fld>
             <a:endParaRPr lang="es-ES"/>
           </a:p>
@@ -4726,7 +4732,7 @@
         </p:spPr>
         <p:txBody>
           <a:bodyPr>
-            <a:normAutofit fontScale="70000" lnSpcReduction="20000"/>
+            <a:normAutofit fontScale="77500" lnSpcReduction="20000"/>
           </a:bodyPr>
           <a:lstStyle/>
           <a:p>
@@ -4746,14 +4752,20 @@
             <a:pPr lvl="1"/>
             <a:r>
               <a:rPr lang="es-ES" dirty="0"/>
-              <a:t>¿2º clic (objeto ya seleccionado): des selecciona?</a:t>
+              <a:t>2º clic (objeto ya seleccionado): des selecciona</a:t>
             </a:r>
           </a:p>
           <a:p>
             <a:pPr lvl="1"/>
             <a:r>
               <a:rPr lang="es-ES" dirty="0"/>
-              <a:t>¿Al elegir los 3 , se comprueba automáticamente? ¿Añadir botón comprobar?</a:t>
+              <a:t>Añadir botón comprobar</a:t>
+            </a:r>
+          </a:p>
+          <a:p>
+            <a:r>
+              <a:rPr lang="es-ES" dirty="0"/>
+              <a:t>Tiempo: cronómetro / contrarreloj </a:t>
             </a:r>
           </a:p>
           <a:p>
@@ -4799,33 +4811,26 @@
           <a:p>
             <a:r>
               <a:rPr lang="es-ES" dirty="0"/>
-              <a:t>Botón Cambiar mazo: </a:t>
+              <a:t>Botón Pista:</a:t>
             </a:r>
           </a:p>
           <a:p>
             <a:pPr lvl="1"/>
             <a:r>
               <a:rPr lang="es-ES" dirty="0"/>
-              <a:t>Recoger cartas y sacar nuevas.</a:t>
-            </a:r>
-          </a:p>
-          <a:p>
-            <a:r>
-              <a:rPr lang="es-ES" dirty="0"/>
-              <a:t>Botón Pista:</a:t>
-            </a:r>
-          </a:p>
-          <a:p>
-            <a:pPr lvl="1"/>
-            <a:r>
-              <a:rPr lang="es-ES" dirty="0"/>
-              <a:t>Completa un set. ¿Marcar en “Sets conseguidos” con otro color?</a:t>
-            </a:r>
-          </a:p>
-          <a:p>
-            <a:r>
-              <a:rPr lang="es-ES" i="1" dirty="0"/>
-              <a:t>Añadir 3, cambiar de mazo y dar pista: ¿penalizan? ¿poner sólo según nivel?</a:t>
+              <a:t>Completa un set. Puntúa 0,5 </a:t>
+            </a:r>
+          </a:p>
+          <a:p>
+            <a:r>
+              <a:rPr lang="es-ES" dirty="0"/>
+              <a:t>Botón set: valida set.</a:t>
+            </a:r>
+          </a:p>
+          <a:p>
+            <a:r>
+              <a:rPr lang="es-ES" dirty="0"/>
+              <a:t>Sets conseguidos: botón para mostrar todos</a:t>
             </a:r>
           </a:p>
         </p:txBody>
@@ -4844,7 +4849,7 @@
         </p:nvSpPr>
         <p:spPr>
           <a:xfrm>
-            <a:off x="457200" y="2346326"/>
+            <a:off x="457200" y="2419478"/>
             <a:ext cx="1737738" cy="1169551"/>
           </a:xfrm>
           <a:prstGeom prst="rect">
@@ -4900,7 +4905,7 @@
         </p:nvSpPr>
         <p:spPr>
           <a:xfrm>
-            <a:off x="731899" y="1612977"/>
+            <a:off x="731899" y="1686129"/>
             <a:ext cx="1251203" cy="584775"/>
           </a:xfrm>
           <a:prstGeom prst="rect">
@@ -4927,7 +4932,7 @@
                   <a:schemeClr val="bg1"/>
                 </a:solidFill>
               </a:rPr>
-              <a:t>03:00</a:t>
+              <a:t>00:00</a:t>
             </a:r>
           </a:p>
         </p:txBody>
@@ -4946,7 +4951,7 @@
         </p:nvSpPr>
         <p:spPr>
           <a:xfrm>
-            <a:off x="731899" y="5160960"/>
+            <a:off x="823339" y="5160960"/>
             <a:ext cx="1095378" cy="706574"/>
           </a:xfrm>
           <a:prstGeom prst="ellipse">
@@ -4981,12 +4986,74 @@
           </a:p>
         </p:txBody>
       </p:sp>
-      <p:sp>
-        <p:nvSpPr>
-          <p:cNvPr id="16" name="Elipse 15">
-            <a:extLst>
-              <a:ext uri="{FF2B5EF4-FFF2-40B4-BE49-F238E27FC236}">
-                <a16:creationId xmlns:a16="http://schemas.microsoft.com/office/drawing/2014/main" id="{A66DAB1D-0620-DA41-6E36-AE8D4B7CB5E3}"/>
+      <p:pic>
+        <p:nvPicPr>
+          <p:cNvPr id="20" name="Imagen 19">
+            <a:extLst>
+              <a:ext uri="{FF2B5EF4-FFF2-40B4-BE49-F238E27FC236}">
+                <a16:creationId xmlns:a16="http://schemas.microsoft.com/office/drawing/2014/main" id="{AEEF3CF4-838F-DD40-797A-105E23EB32C9}"/>
+              </a:ext>
+            </a:extLst>
+          </p:cNvPr>
+          <p:cNvPicPr>
+            <a:picLocks noChangeAspect="1"/>
+          </p:cNvPicPr>
+          <p:nvPr/>
+        </p:nvPicPr>
+        <p:blipFill>
+          <a:blip r:embed="rId4"/>
+          <a:srcRect b="12088"/>
+          <a:stretch>
+            <a:fillRect/>
+          </a:stretch>
+        </p:blipFill>
+        <p:spPr>
+          <a:xfrm>
+            <a:off x="671605" y="3377770"/>
+            <a:ext cx="1058696" cy="588165"/>
+          </a:xfrm>
+          <a:prstGeom prst="rect">
+            <a:avLst/>
+          </a:prstGeom>
+        </p:spPr>
+      </p:pic>
+      <p:pic>
+        <p:nvPicPr>
+          <p:cNvPr id="22" name="Imagen 21">
+            <a:extLst>
+              <a:ext uri="{FF2B5EF4-FFF2-40B4-BE49-F238E27FC236}">
+                <a16:creationId xmlns:a16="http://schemas.microsoft.com/office/drawing/2014/main" id="{804A71EF-49FD-157F-7456-354C19C8BCD1}"/>
+              </a:ext>
+            </a:extLst>
+          </p:cNvPr>
+          <p:cNvPicPr>
+            <a:picLocks noChangeAspect="1"/>
+          </p:cNvPicPr>
+          <p:nvPr/>
+        </p:nvPicPr>
+        <p:blipFill>
+          <a:blip r:embed="rId5"/>
+          <a:srcRect t="10287"/>
+          <a:stretch>
+            <a:fillRect/>
+          </a:stretch>
+        </p:blipFill>
+        <p:spPr>
+          <a:xfrm>
+            <a:off x="663989" y="3995917"/>
+            <a:ext cx="1021936" cy="527660"/>
+          </a:xfrm>
+          <a:prstGeom prst="rect">
+            <a:avLst/>
+          </a:prstGeom>
+        </p:spPr>
+      </p:pic>
+      <p:sp>
+        <p:nvSpPr>
+          <p:cNvPr id="23" name="Elipse 22">
+            <a:extLst>
+              <a:ext uri="{FF2B5EF4-FFF2-40B4-BE49-F238E27FC236}">
+                <a16:creationId xmlns:a16="http://schemas.microsoft.com/office/drawing/2014/main" id="{CF90A41F-E71A-D282-5768-1916863EE261}"/>
               </a:ext>
             </a:extLst>
           </p:cNvPr>
@@ -4995,7 +5062,7 @@
         </p:nvSpPr>
         <p:spPr>
           <a:xfrm>
-            <a:off x="3221361" y="5160960"/>
+            <a:off x="2068070" y="5176263"/>
             <a:ext cx="1095378" cy="706574"/>
           </a:xfrm>
           <a:prstGeom prst="ellipse">
@@ -5025,88 +5092,26 @@
             <a:pPr algn="ctr"/>
             <a:r>
               <a:rPr lang="es-ES" sz="1200" dirty="0"/>
-              <a:t>Cambiar mazo</a:t>
-            </a:r>
-          </a:p>
-        </p:txBody>
-      </p:sp>
-      <p:pic>
-        <p:nvPicPr>
-          <p:cNvPr id="20" name="Imagen 19">
-            <a:extLst>
-              <a:ext uri="{FF2B5EF4-FFF2-40B4-BE49-F238E27FC236}">
-                <a16:creationId xmlns:a16="http://schemas.microsoft.com/office/drawing/2014/main" id="{AEEF3CF4-838F-DD40-797A-105E23EB32C9}"/>
-              </a:ext>
-            </a:extLst>
-          </p:cNvPr>
-          <p:cNvPicPr>
-            <a:picLocks noChangeAspect="1"/>
-          </p:cNvPicPr>
+              <a:t>Añadir 3</a:t>
+            </a:r>
+          </a:p>
+        </p:txBody>
+      </p:sp>
+      <p:sp>
+        <p:nvSpPr>
+          <p:cNvPr id="24" name="Elipse 23">
+            <a:extLst>
+              <a:ext uri="{FF2B5EF4-FFF2-40B4-BE49-F238E27FC236}">
+                <a16:creationId xmlns:a16="http://schemas.microsoft.com/office/drawing/2014/main" id="{A09A874B-4624-557D-D640-AB744F00D1AA}"/>
+              </a:ext>
+            </a:extLst>
+          </p:cNvPr>
+          <p:cNvSpPr/>
           <p:nvPr/>
-        </p:nvPicPr>
-        <p:blipFill>
-          <a:blip r:embed="rId4"/>
-          <a:srcRect b="12088"/>
-          <a:stretch>
-            <a:fillRect/>
-          </a:stretch>
-        </p:blipFill>
+        </p:nvSpPr>
         <p:spPr>
           <a:xfrm>
-            <a:off x="671605" y="3304618"/>
-            <a:ext cx="1058696" cy="588165"/>
-          </a:xfrm>
-          <a:prstGeom prst="rect">
-            <a:avLst/>
-          </a:prstGeom>
-        </p:spPr>
-      </p:pic>
-      <p:pic>
-        <p:nvPicPr>
-          <p:cNvPr id="22" name="Imagen 21">
-            <a:extLst>
-              <a:ext uri="{FF2B5EF4-FFF2-40B4-BE49-F238E27FC236}">
-                <a16:creationId xmlns:a16="http://schemas.microsoft.com/office/drawing/2014/main" id="{804A71EF-49FD-157F-7456-354C19C8BCD1}"/>
-              </a:ext>
-            </a:extLst>
-          </p:cNvPr>
-          <p:cNvPicPr>
-            <a:picLocks noChangeAspect="1"/>
-          </p:cNvPicPr>
-          <p:nvPr/>
-        </p:nvPicPr>
-        <p:blipFill>
-          <a:blip r:embed="rId5"/>
-          <a:srcRect t="10287"/>
-          <a:stretch>
-            <a:fillRect/>
-          </a:stretch>
-        </p:blipFill>
-        <p:spPr>
-          <a:xfrm>
-            <a:off x="663989" y="3922765"/>
-            <a:ext cx="1021936" cy="527660"/>
-          </a:xfrm>
-          <a:prstGeom prst="rect">
-            <a:avLst/>
-          </a:prstGeom>
-        </p:spPr>
-      </p:pic>
-      <p:sp>
-        <p:nvSpPr>
-          <p:cNvPr id="23" name="Elipse 22">
-            <a:extLst>
-              <a:ext uri="{FF2B5EF4-FFF2-40B4-BE49-F238E27FC236}">
-                <a16:creationId xmlns:a16="http://schemas.microsoft.com/office/drawing/2014/main" id="{CF90A41F-E71A-D282-5768-1916863EE261}"/>
-              </a:ext>
-            </a:extLst>
-          </p:cNvPr>
-          <p:cNvSpPr/>
-          <p:nvPr/>
-        </p:nvSpPr>
-        <p:spPr>
-          <a:xfrm>
-            <a:off x="1976630" y="5176263"/>
+            <a:off x="3304804" y="5176263"/>
             <a:ext cx="1095378" cy="706574"/>
           </a:xfrm>
           <a:prstGeom prst="ellipse">
@@ -5136,55 +5141,6 @@
             <a:pPr algn="ctr"/>
             <a:r>
               <a:rPr lang="es-ES" sz="1200" dirty="0"/>
-              <a:t>Añadir 3</a:t>
-            </a:r>
-          </a:p>
-        </p:txBody>
-      </p:sp>
-      <p:sp>
-        <p:nvSpPr>
-          <p:cNvPr id="24" name="Elipse 23">
-            <a:extLst>
-              <a:ext uri="{FF2B5EF4-FFF2-40B4-BE49-F238E27FC236}">
-                <a16:creationId xmlns:a16="http://schemas.microsoft.com/office/drawing/2014/main" id="{A09A874B-4624-557D-D640-AB744F00D1AA}"/>
-              </a:ext>
-            </a:extLst>
-          </p:cNvPr>
-          <p:cNvSpPr/>
-          <p:nvPr/>
-        </p:nvSpPr>
-        <p:spPr>
-          <a:xfrm>
-            <a:off x="4466092" y="5176263"/>
-            <a:ext cx="1095378" cy="706574"/>
-          </a:xfrm>
-          <a:prstGeom prst="ellipse">
-            <a:avLst/>
-          </a:prstGeom>
-        </p:spPr>
-        <p:style>
-          <a:lnRef idx="2">
-            <a:schemeClr val="accent1">
-              <a:shade val="15000"/>
-            </a:schemeClr>
-          </a:lnRef>
-          <a:fillRef idx="1">
-            <a:schemeClr val="accent1"/>
-          </a:fillRef>
-          <a:effectRef idx="0">
-            <a:schemeClr val="accent1"/>
-          </a:effectRef>
-          <a:fontRef idx="minor">
-            <a:schemeClr val="lt1"/>
-          </a:fontRef>
-        </p:style>
-        <p:txBody>
-          <a:bodyPr rtlCol="0" anchor="ctr"/>
-          <a:lstStyle/>
-          <a:p>
-            <a:pPr algn="ctr"/>
-            <a:r>
-              <a:rPr lang="es-ES" sz="1200" dirty="0"/>
               <a:t>Pista</a:t>
             </a:r>
           </a:p>
@@ -5215,7 +5171,7 @@
         </p:spPr>
         <p:txBody>
           <a:bodyPr vert="horz" lIns="91440" tIns="45720" rIns="91440" bIns="45720" rtlCol="0">
-            <a:normAutofit fontScale="77500" lnSpcReduction="20000"/>
+            <a:normAutofit fontScale="92500" lnSpcReduction="10000"/>
           </a:bodyPr>
           <a:lstStyle>
             <a:lvl1pPr marL="228600" indent="-228600" algn="l" defTabSz="914400" rtl="0" eaLnBrk="1" latinLnBrk="0" hangingPunct="1">
@@ -5388,24 +5344,66 @@
             </a:r>
           </a:p>
           <a:p>
-            <a:pPr lvl="1"/>
+            <a:pPr marL="361950" lvl="1"/>
             <a:r>
               <a:rPr lang="es-ES" sz="1800" dirty="0"/>
               <a:t>Partidas</a:t>
             </a:r>
           </a:p>
           <a:p>
-            <a:pPr lvl="1"/>
-            <a:r>
-              <a:rPr lang="es-ES" sz="1800" dirty="0"/>
-              <a:t>Mazo</a:t>
-            </a:r>
-          </a:p>
-          <a:p>
-            <a:pPr lvl="1"/>
+            <a:pPr marL="361950" lvl="1"/>
             <a:r>
               <a:rPr lang="es-ES" sz="1800" dirty="0"/>
               <a:t>Cartas</a:t>
+            </a:r>
+          </a:p>
+        </p:txBody>
+      </p:sp>
+      <p:sp>
+        <p:nvSpPr>
+          <p:cNvPr id="3" name="Elipse 2">
+            <a:extLst>
+              <a:ext uri="{FF2B5EF4-FFF2-40B4-BE49-F238E27FC236}">
+                <a16:creationId xmlns:a16="http://schemas.microsoft.com/office/drawing/2014/main" id="{B33BDB9E-DAD1-1EEE-02FE-0B2B6E668B97}"/>
+              </a:ext>
+            </a:extLst>
+          </p:cNvPr>
+          <p:cNvSpPr/>
+          <p:nvPr/>
+        </p:nvSpPr>
+        <p:spPr>
+          <a:xfrm>
+            <a:off x="4541538" y="5167202"/>
+            <a:ext cx="1095378" cy="706574"/>
+          </a:xfrm>
+          <a:prstGeom prst="ellipse">
+            <a:avLst/>
+          </a:prstGeom>
+        </p:spPr>
+        <p:style>
+          <a:lnRef idx="2">
+            <a:schemeClr val="accent1">
+              <a:shade val="15000"/>
+            </a:schemeClr>
+          </a:lnRef>
+          <a:fillRef idx="1">
+            <a:schemeClr val="accent1"/>
+          </a:fillRef>
+          <a:effectRef idx="0">
+            <a:schemeClr val="accent1"/>
+          </a:effectRef>
+          <a:fontRef idx="minor">
+            <a:schemeClr val="lt1"/>
+          </a:fontRef>
+        </p:style>
+        <p:txBody>
+          <a:bodyPr rtlCol="0" anchor="ctr"/>
+          <a:lstStyle/>
+          <a:p>
+            <a:pPr algn="ctr"/>
+            <a:r>
+              <a:rPr lang="es-ES" sz="1200" dirty="0"/>
+              <a:t>Set</a:t>
             </a:r>
           </a:p>
         </p:txBody>
@@ -5486,12 +5484,91 @@
         </p:nvSpPr>
         <p:spPr/>
         <p:txBody>
-          <a:bodyPr/>
+          <a:bodyPr>
+            <a:normAutofit fontScale="55000" lnSpcReduction="20000"/>
+          </a:bodyPr>
           <a:lstStyle/>
           <a:p>
             <a:r>
               <a:rPr lang="es-ES" dirty="0"/>
               <a:t>Nivel: 1 (fácil), 2 (normal), 3 (difícil). Default: 2</a:t>
+            </a:r>
+          </a:p>
+          <a:p>
+            <a:pPr lvl="1"/>
+            <a:r>
+              <a:rPr lang="es-ES" dirty="0"/>
+              <a:t>Fácil: </a:t>
+            </a:r>
+          </a:p>
+          <a:p>
+            <a:pPr lvl="2"/>
+            <a:r>
+              <a:rPr lang="es-ES" dirty="0"/>
+              <a:t>Quita una condición</a:t>
+            </a:r>
+          </a:p>
+          <a:p>
+            <a:pPr lvl="2"/>
+            <a:r>
+              <a:rPr lang="es-ES" dirty="0"/>
+              <a:t>Dar pista, añadir 3</a:t>
+            </a:r>
+          </a:p>
+          <a:p>
+            <a:pPr lvl="2"/>
+            <a:r>
+              <a:rPr lang="es-ES" dirty="0"/>
+              <a:t>Penalización: 0</a:t>
+            </a:r>
+          </a:p>
+          <a:p>
+            <a:pPr lvl="1"/>
+            <a:r>
+              <a:rPr lang="es-ES" dirty="0"/>
+              <a:t>Normal</a:t>
+            </a:r>
+          </a:p>
+          <a:p>
+            <a:pPr lvl="2"/>
+            <a:r>
+              <a:rPr lang="es-ES" dirty="0"/>
+              <a:t>Añadir 3</a:t>
+            </a:r>
+          </a:p>
+          <a:p>
+            <a:pPr lvl="2"/>
+            <a:r>
+              <a:rPr lang="es-ES" dirty="0"/>
+              <a:t>Penalización: 0,5</a:t>
+            </a:r>
+          </a:p>
+          <a:p>
+            <a:pPr lvl="1"/>
+            <a:r>
+              <a:rPr lang="es-ES" dirty="0"/>
+              <a:t>Difícil</a:t>
+            </a:r>
+          </a:p>
+          <a:p>
+            <a:pPr lvl="2"/>
+            <a:r>
+              <a:rPr lang="es-ES" dirty="0"/>
+              <a:t>Contrarreloj</a:t>
+            </a:r>
+          </a:p>
+          <a:p>
+            <a:pPr lvl="2"/>
+            <a:r>
+              <a:rPr lang="es-ES" dirty="0"/>
+              <a:t>Sin botones de ayuda</a:t>
+            </a:r>
+          </a:p>
+          <a:p>
+            <a:pPr lvl="2"/>
+            <a:r>
+              <a:rPr lang="es-ES" dirty="0"/>
+              <a:t>Penalizar: 1 </a:t>
             </a:r>
           </a:p>
           <a:p>
@@ -5546,6 +5623,15 @@
                 <a:sym typeface="Wingdings" panose="05000000000000000000" pitchFamily="2" charset="2"/>
               </a:rPr>
               <a:t>Penalizaciones</a:t>
+            </a:r>
+          </a:p>
+          <a:p>
+            <a:pPr lvl="1"/>
+            <a:r>
+              <a:rPr lang="es-ES" dirty="0">
+                <a:sym typeface="Wingdings" panose="05000000000000000000" pitchFamily="2" charset="2"/>
+              </a:rPr>
+              <a:t>Tiempo </a:t>
             </a:r>
           </a:p>
           <a:p>
@@ -5805,14 +5891,14 @@
             <p:ph sz="half" idx="1"/>
             <p:extLst>
               <p:ext uri="{D42A27DB-BD31-4B8C-83A1-F6EECF244321}">
-                <p14:modId xmlns:p14="http://schemas.microsoft.com/office/powerpoint/2010/main" val="303349371"/>
+                <p14:modId xmlns:p14="http://schemas.microsoft.com/office/powerpoint/2010/main" val="2376797008"/>
               </p:ext>
             </p:extLst>
           </p:nvPr>
         </p:nvGraphicFramePr>
         <p:xfrm>
           <a:off x="838200" y="1892808"/>
-          <a:ext cx="10515603" cy="1280160"/>
+          <a:ext cx="10515603" cy="1010920"/>
         </p:xfrm>
         <a:graphic>
           <a:graphicData uri="http://schemas.openxmlformats.org/drawingml/2006/table">
@@ -6022,12 +6108,8 @@
                     <a:lstStyle/>
                     <a:p>
                       <a:r>
-                        <a:rPr lang="es-ES" dirty="0" err="1"/>
-                        <a:t>Float</a:t>
-                      </a:r>
-                      <a:r>
                         <a:rPr lang="es-ES" dirty="0"/>
-                        <a:t> o min/</a:t>
+                        <a:t>min/</a:t>
                       </a:r>
                       <a:r>
                         <a:rPr lang="es-ES" dirty="0" err="1"/>
@@ -6254,7 +6336,7 @@
         </p:spPr>
         <p:txBody>
           <a:bodyPr>
-            <a:normAutofit/>
+            <a:normAutofit fontScale="92500"/>
           </a:bodyPr>
           <a:lstStyle/>
           <a:p>
@@ -6282,7 +6364,7 @@
             </a:r>
             <a:r>
               <a:rPr lang="es-ES" dirty="0"/>
-              <a:t> puntuación</a:t>
+              <a:t> puntuación (tiempo, errores, fecha)</a:t>
             </a:r>
           </a:p>
         </p:txBody>
@@ -6303,14 +6385,14 @@
             <p:ph sz="half" idx="1"/>
             <p:extLst>
               <p:ext uri="{D42A27DB-BD31-4B8C-83A1-F6EECF244321}">
-                <p14:modId xmlns:p14="http://schemas.microsoft.com/office/powerpoint/2010/main" val="1446435105"/>
+                <p14:modId xmlns:p14="http://schemas.microsoft.com/office/powerpoint/2010/main" val="1894477975"/>
               </p:ext>
             </p:extLst>
           </p:nvPr>
         </p:nvGraphicFramePr>
         <p:xfrm>
           <a:off x="838200" y="1892808"/>
-          <a:ext cx="10515600" cy="1280160"/>
+          <a:ext cx="9275064" cy="1010920"/>
         </p:xfrm>
         <a:graphic>
           <a:graphicData uri="http://schemas.openxmlformats.org/drawingml/2006/table">
@@ -6337,13 +6419,6 @@
                   <a:extLst>
                     <a:ext uri="{9D8B030D-6E8A-4147-A177-3AD203B41FA5}">
                       <a16:colId xmlns:a16="http://schemas.microsoft.com/office/drawing/2014/main" val="2805946065"/>
-                    </a:ext>
-                  </a:extLst>
-                </a:gridCol>
-                <a:gridCol w="1240536">
-                  <a:extLst>
-                    <a:ext uri="{9D8B030D-6E8A-4147-A177-3AD203B41FA5}">
-                      <a16:colId xmlns:a16="http://schemas.microsoft.com/office/drawing/2014/main" val="2019405638"/>
                     </a:ext>
                   </a:extLst>
                 </a:gridCol>
@@ -6428,19 +6503,6 @@
                       <a:r>
                         <a:rPr lang="es-ES" dirty="0"/>
                         <a:t>Fecha</a:t>
-                      </a:r>
-                    </a:p>
-                  </a:txBody>
-                  <a:tcPr/>
-                </a:tc>
-                <a:tc>
-                  <a:txBody>
-                    <a:bodyPr/>
-                    <a:lstStyle/>
-                    <a:p>
-                      <a:r>
-                        <a:rPr lang="es-ES" dirty="0"/>
-                        <a:t>Nivel</a:t>
                       </a:r>
                     </a:p>
                   </a:txBody>
@@ -6556,39 +6618,14 @@
                     <a:lstStyle/>
                     <a:p>
                       <a:r>
-                        <a:rPr lang="es-ES" dirty="0" err="1"/>
-                        <a:t>String</a:t>
-                      </a:r>
-                      <a:endParaRPr lang="es-ES" dirty="0"/>
-                    </a:p>
-                  </a:txBody>
-                  <a:tcPr/>
-                </a:tc>
-                <a:tc>
-                  <a:txBody>
-                    <a:bodyPr/>
-                    <a:lstStyle/>
-                    <a:p>
-                      <a:r>
                         <a:rPr lang="es-ES" dirty="0"/>
-                        <a:t>¿</a:t>
-                      </a:r>
-                      <a:r>
-                        <a:rPr lang="es-ES" dirty="0" err="1"/>
-                        <a:t>Float</a:t>
-                      </a:r>
-                      <a:r>
-                        <a:rPr lang="es-ES" dirty="0"/>
-                        <a:t> o min/</a:t>
+                        <a:t>min/</a:t>
                       </a:r>
                       <a:r>
                         <a:rPr lang="es-ES" dirty="0" err="1"/>
                         <a:t>seg</a:t>
                       </a:r>
-                      <a:r>
-                        <a:rPr lang="es-ES" dirty="0"/>
-                        <a:t>?</a:t>
-                      </a:r>
+                      <a:endParaRPr lang="es-ES" dirty="0"/>
                     </a:p>
                   </a:txBody>
                   <a:tcPr/>
@@ -6673,7 +6710,7 @@
         </p:spPr>
         <p:txBody>
           <a:bodyPr vert="horz" lIns="91440" tIns="45720" rIns="91440" bIns="45720" rtlCol="0">
-            <a:normAutofit fontScale="62500" lnSpcReduction="20000"/>
+            <a:normAutofit fontScale="70000" lnSpcReduction="20000"/>
           </a:bodyPr>
           <a:lstStyle>
             <a:lvl1pPr marL="228600" indent="-228600" algn="l" defTabSz="914400" rtl="0" eaLnBrk="1" latinLnBrk="0" hangingPunct="1">
@@ -6842,33 +6879,25 @@
           <a:p>
             <a:r>
               <a:rPr lang="es-ES" dirty="0"/>
-              <a:t>¿Hacer rankings diferentes por cada nivel (3 tablas de ranking)?</a:t>
-            </a:r>
-          </a:p>
-          <a:p>
-            <a:r>
-              <a:rPr lang="es-ES" dirty="0"/>
-              <a:t>¿Limitar </a:t>
-            </a:r>
-            <a:r>
-              <a:rPr lang="es-ES" dirty="0" err="1"/>
-              <a:t>num</a:t>
-            </a:r>
-            <a:r>
-              <a:rPr lang="es-ES" dirty="0"/>
-              <a:t> a mostrar (ej.: sólo los top 15)?</a:t>
-            </a:r>
-          </a:p>
-          <a:p>
-            <a:r>
-              <a:rPr lang="es-ES" dirty="0"/>
-              <a:t>¿Un mismo jugador puede aparecer varias veces?</a:t>
-            </a:r>
-          </a:p>
-          <a:p>
-            <a:r>
-              <a:rPr lang="es-ES" dirty="0"/>
-              <a:t>¿Partidas no finalizadas cuentan?</a:t>
+              <a:t>Rankings diferentes por cada nivel (3 tablas de ranking)</a:t>
+            </a:r>
+          </a:p>
+          <a:p>
+            <a:r>
+              <a:rPr lang="es-ES" dirty="0"/>
+              <a:t>TOP 10</a:t>
+            </a:r>
+          </a:p>
+          <a:p>
+            <a:r>
+              <a:rPr lang="es-ES" dirty="0"/>
+              <a:t>Un mismo jugador puede aparecer varias veces</a:t>
+            </a:r>
+          </a:p>
+          <a:p>
+            <a:r>
+              <a:rPr lang="es-ES" dirty="0"/>
+              <a:t>Partidas no finalizadas cuentan</a:t>
             </a:r>
           </a:p>
         </p:txBody>
@@ -7172,6 +7201,234 @@
     <p:extLst>
       <p:ext uri="{BB962C8B-B14F-4D97-AF65-F5344CB8AC3E}">
         <p14:creationId xmlns:p14="http://schemas.microsoft.com/office/powerpoint/2010/main" val="2501821334"/>
+      </p:ext>
+    </p:extLst>
+  </p:cSld>
+  <p:clrMapOvr>
+    <a:masterClrMapping/>
+  </p:clrMapOvr>
+</p:sld>
+</file>
+
+<file path=ppt/slides/slide9.xml><?xml version="1.0" encoding="utf-8"?>
+<p:sld xmlns:a="http://schemas.openxmlformats.org/drawingml/2006/main" xmlns:r="http://schemas.openxmlformats.org/officeDocument/2006/relationships" xmlns:p="http://schemas.openxmlformats.org/presentationml/2006/main">
+  <p:cSld>
+    <p:spTree>
+      <p:nvGrpSpPr>
+        <p:cNvPr id="1" name=""/>
+        <p:cNvGrpSpPr/>
+        <p:nvPr/>
+      </p:nvGrpSpPr>
+      <p:grpSpPr>
+        <a:xfrm>
+          <a:off x="0" y="0"/>
+          <a:ext cx="0" cy="0"/>
+          <a:chOff x="0" y="0"/>
+          <a:chExt cx="0" cy="0"/>
+        </a:xfrm>
+      </p:grpSpPr>
+      <p:sp>
+        <p:nvSpPr>
+          <p:cNvPr id="2" name="Título 1">
+            <a:extLst>
+              <a:ext uri="{FF2B5EF4-FFF2-40B4-BE49-F238E27FC236}">
+                <a16:creationId xmlns:a16="http://schemas.microsoft.com/office/drawing/2014/main" id="{D664C200-FBAD-1133-E4CE-FD63A87DF840}"/>
+              </a:ext>
+            </a:extLst>
+          </p:cNvPr>
+          <p:cNvSpPr>
+            <a:spLocks noGrp="1"/>
+          </p:cNvSpPr>
+          <p:nvPr>
+            <p:ph type="title"/>
+          </p:nvPr>
+        </p:nvSpPr>
+        <p:spPr/>
+        <p:txBody>
+          <a:bodyPr/>
+          <a:lstStyle/>
+          <a:p>
+            <a:r>
+              <a:rPr lang="es-ES" dirty="0"/>
+              <a:t>Bases de datos</a:t>
+            </a:r>
+          </a:p>
+        </p:txBody>
+      </p:sp>
+      <p:sp>
+        <p:nvSpPr>
+          <p:cNvPr id="3" name="Marcador de contenido 2">
+            <a:extLst>
+              <a:ext uri="{FF2B5EF4-FFF2-40B4-BE49-F238E27FC236}">
+                <a16:creationId xmlns:a16="http://schemas.microsoft.com/office/drawing/2014/main" id="{C58D6AED-384B-6099-D69B-6A3CAE60E740}"/>
+              </a:ext>
+            </a:extLst>
+          </p:cNvPr>
+          <p:cNvSpPr>
+            <a:spLocks noGrp="1"/>
+          </p:cNvSpPr>
+          <p:nvPr>
+            <p:ph sz="half" idx="1"/>
+          </p:nvPr>
+        </p:nvSpPr>
+        <p:spPr/>
+        <p:txBody>
+          <a:bodyPr>
+            <a:normAutofit fontScale="70000" lnSpcReduction="20000"/>
+          </a:bodyPr>
+          <a:lstStyle/>
+          <a:p>
+            <a:r>
+              <a:rPr lang="es-ES" dirty="0"/>
+              <a:t>Tabla partidas</a:t>
+            </a:r>
+          </a:p>
+          <a:p>
+            <a:pPr lvl="1"/>
+            <a:r>
+              <a:rPr lang="es-ES" dirty="0" err="1"/>
+              <a:t>idGame</a:t>
+            </a:r>
+            <a:endParaRPr lang="es-ES" dirty="0"/>
+          </a:p>
+          <a:p>
+            <a:pPr lvl="1"/>
+            <a:r>
+              <a:rPr lang="es-ES" dirty="0" err="1"/>
+              <a:t>idUser</a:t>
+            </a:r>
+            <a:endParaRPr lang="es-ES" dirty="0"/>
+          </a:p>
+          <a:p>
+            <a:pPr lvl="1"/>
+            <a:r>
+              <a:rPr lang="es-ES" dirty="0"/>
+              <a:t>date</a:t>
+            </a:r>
+          </a:p>
+          <a:p>
+            <a:pPr lvl="1"/>
+            <a:r>
+              <a:rPr lang="es-ES" dirty="0" err="1"/>
+              <a:t>level</a:t>
+            </a:r>
+            <a:endParaRPr lang="es-ES" dirty="0"/>
+          </a:p>
+          <a:p>
+            <a:pPr lvl="1"/>
+            <a:r>
+              <a:rPr lang="es-ES" dirty="0" err="1"/>
+              <a:t>point</a:t>
+            </a:r>
+            <a:endParaRPr lang="es-ES" dirty="0"/>
+          </a:p>
+          <a:p>
+            <a:pPr lvl="1"/>
+            <a:r>
+              <a:rPr lang="es-ES" dirty="0"/>
+              <a:t>time</a:t>
+            </a:r>
+          </a:p>
+          <a:p>
+            <a:r>
+              <a:rPr lang="es-ES" dirty="0"/>
+              <a:t>Tabla usuarios</a:t>
+            </a:r>
+          </a:p>
+          <a:p>
+            <a:pPr lvl="1"/>
+            <a:r>
+              <a:rPr lang="es-ES" dirty="0" err="1"/>
+              <a:t>idUser</a:t>
+            </a:r>
+            <a:endParaRPr lang="es-ES" dirty="0"/>
+          </a:p>
+          <a:p>
+            <a:pPr lvl="1"/>
+            <a:r>
+              <a:rPr lang="es-ES" dirty="0" err="1"/>
+              <a:t>nameUser</a:t>
+            </a:r>
+            <a:endParaRPr lang="es-ES" dirty="0"/>
+          </a:p>
+          <a:p>
+            <a:pPr lvl="1"/>
+            <a:r>
+              <a:rPr lang="es-ES" dirty="0" err="1"/>
+              <a:t>password</a:t>
+            </a:r>
+            <a:endParaRPr lang="es-ES" dirty="0"/>
+          </a:p>
+          <a:p>
+            <a:r>
+              <a:rPr lang="es-ES" dirty="0"/>
+              <a:t>Tabla cartas</a:t>
+            </a:r>
+          </a:p>
+          <a:p>
+            <a:pPr lvl="1"/>
+            <a:r>
+              <a:rPr lang="es-ES" dirty="0" err="1"/>
+              <a:t>idCart</a:t>
+            </a:r>
+            <a:endParaRPr lang="es-ES" dirty="0"/>
+          </a:p>
+          <a:p>
+            <a:pPr lvl="1"/>
+            <a:r>
+              <a:rPr lang="es-ES" dirty="0" err="1"/>
+              <a:t>form</a:t>
+            </a:r>
+            <a:endParaRPr lang="es-ES" dirty="0"/>
+          </a:p>
+          <a:p>
+            <a:pPr lvl="1"/>
+            <a:r>
+              <a:rPr lang="es-ES" dirty="0"/>
+              <a:t>color</a:t>
+            </a:r>
+          </a:p>
+          <a:p>
+            <a:pPr lvl="1"/>
+            <a:r>
+              <a:rPr lang="es-ES" dirty="0" err="1"/>
+              <a:t>background</a:t>
+            </a:r>
+            <a:endParaRPr lang="es-ES" dirty="0"/>
+          </a:p>
+        </p:txBody>
+      </p:sp>
+      <p:sp>
+        <p:nvSpPr>
+          <p:cNvPr id="4" name="Marcador de contenido 3">
+            <a:extLst>
+              <a:ext uri="{FF2B5EF4-FFF2-40B4-BE49-F238E27FC236}">
+                <a16:creationId xmlns:a16="http://schemas.microsoft.com/office/drawing/2014/main" id="{F1A40DA3-D254-5CC4-130E-2D918A039D6E}"/>
+              </a:ext>
+            </a:extLst>
+          </p:cNvPr>
+          <p:cNvSpPr>
+            <a:spLocks noGrp="1"/>
+          </p:cNvSpPr>
+          <p:nvPr>
+            <p:ph sz="half" idx="2"/>
+          </p:nvPr>
+        </p:nvSpPr>
+        <p:spPr/>
+        <p:txBody>
+          <a:bodyPr>
+            <a:normAutofit fontScale="70000" lnSpcReduction="20000"/>
+          </a:bodyPr>
+          <a:lstStyle/>
+          <a:p>
+            <a:endParaRPr lang="es-ES"/>
+          </a:p>
+        </p:txBody>
+      </p:sp>
+    </p:spTree>
+    <p:extLst>
+      <p:ext uri="{BB962C8B-B14F-4D97-AF65-F5344CB8AC3E}">
+        <p14:creationId xmlns:p14="http://schemas.microsoft.com/office/powerpoint/2010/main" val="1240141431"/>
       </p:ext>
     </p:extLst>
   </p:cSld>

</xml_diff>